<commit_message>
Finish System Desgin V2 - System Architecture
</commit_message>
<xml_diff>
--- a/doc/SystemDesignV2/pic.pptx
+++ b/doc/SystemDesignV2/pic.pptx
@@ -6,7 +6,8 @@
   </p:sldMasterIdLst>
   <p:sldIdLst>
     <p:sldId id="265" r:id="rId2"/>
-    <p:sldId id="263" r:id="rId3"/>
+    <p:sldId id="266" r:id="rId3"/>
+    <p:sldId id="263" r:id="rId4"/>
   </p:sldIdLst>
   <p:sldSz cx="12192000" cy="6858000"/>
   <p:notesSz cx="6858000" cy="9144000"/>
@@ -1303,14 +1304,7 @@
               <a:latin typeface="微软雅黑" panose="020B0503020204020204" pitchFamily="34" charset="-122"/>
               <a:ea typeface="微软雅黑" panose="020B0503020204020204" pitchFamily="34" charset="-122"/>
             </a:rPr>
-            <a:t>全局</a:t>
-          </a:r>
-          <a:r>
-            <a:rPr lang="zh-CN" altLang="en-US" sz="1800" dirty="0" smtClean="0">
-              <a:latin typeface="微软雅黑" panose="020B0503020204020204" pitchFamily="34" charset="-122"/>
-              <a:ea typeface="微软雅黑" panose="020B0503020204020204" pitchFamily="34" charset="-122"/>
-            </a:rPr>
-            <a:t>唯一（存储池唯一）</a:t>
+            <a:t>全局唯一（存储池唯一）</a:t>
           </a:r>
           <a:endParaRPr lang="zh-CN" altLang="en-US" sz="1800" dirty="0">
             <a:latin typeface="微软雅黑" panose="020B0503020204020204" pitchFamily="34" charset="-122"/>
@@ -1408,14 +1402,7 @@
               <a:latin typeface="微软雅黑" panose="020B0503020204020204" pitchFamily="34" charset="-122"/>
               <a:ea typeface="微软雅黑" panose="020B0503020204020204" pitchFamily="34" charset="-122"/>
             </a:rPr>
-            <a:t>键值</a:t>
-          </a:r>
-          <a:r>
-            <a:rPr lang="zh-CN" altLang="en-US" sz="2000" dirty="0" smtClean="0">
-              <a:latin typeface="微软雅黑" panose="020B0503020204020204" pitchFamily="34" charset="-122"/>
-              <a:ea typeface="微软雅黑" panose="020B0503020204020204" pitchFamily="34" charset="-122"/>
-            </a:rPr>
-            <a:t>对（</a:t>
+            <a:t>键值对（</a:t>
           </a:r>
           <a:r>
             <a:rPr lang="en-US" altLang="zh-CN" sz="2000" dirty="0" smtClean="0">
@@ -1733,8 +1720,8 @@
       </dsp:nvSpPr>
       <dsp:spPr>
         <a:xfrm>
-          <a:off x="0" y="179955"/>
-          <a:ext cx="1489817" cy="473098"/>
+          <a:off x="0" y="110756"/>
+          <a:ext cx="1729372" cy="697950"/>
         </a:xfrm>
         <a:prstGeom prst="rect">
           <a:avLst/>
@@ -1788,8 +1775,8 @@
         </a:p>
       </dsp:txBody>
       <dsp:txXfrm>
-        <a:off x="0" y="179955"/>
-        <a:ext cx="1489817" cy="473098"/>
+        <a:off x="0" y="110756"/>
+        <a:ext cx="1729372" cy="697950"/>
       </dsp:txXfrm>
     </dsp:sp>
     <dsp:sp modelId="{5D22F822-A364-4614-B308-E3D085AA44F3}">
@@ -1799,8 +1786,8 @@
       </dsp:nvSpPr>
       <dsp:spPr>
         <a:xfrm>
-          <a:off x="1489817" y="2543"/>
-          <a:ext cx="297963" cy="827922"/>
+          <a:off x="1729372" y="1702"/>
+          <a:ext cx="345874" cy="916059"/>
         </a:xfrm>
         <a:prstGeom prst="leftBrace">
           <a:avLst>
@@ -1843,8 +1830,8 @@
       </dsp:nvSpPr>
       <dsp:spPr>
         <a:xfrm>
-          <a:off x="1906966" y="0"/>
-          <a:ext cx="4052304" cy="827922"/>
+          <a:off x="2213596" y="0"/>
+          <a:ext cx="4703892" cy="916059"/>
         </a:xfrm>
         <a:prstGeom prst="rect">
           <a:avLst/>
@@ -1933,14 +1920,7 @@
               <a:latin typeface="微软雅黑" panose="020B0503020204020204" pitchFamily="34" charset="-122"/>
               <a:ea typeface="微软雅黑" panose="020B0503020204020204" pitchFamily="34" charset="-122"/>
             </a:rPr>
-            <a:t>全局</a:t>
-          </a:r>
-          <a:r>
-            <a:rPr lang="zh-CN" altLang="en-US" sz="1800" kern="1200" dirty="0" smtClean="0">
-              <a:latin typeface="微软雅黑" panose="020B0503020204020204" pitchFamily="34" charset="-122"/>
-              <a:ea typeface="微软雅黑" panose="020B0503020204020204" pitchFamily="34" charset="-122"/>
-            </a:rPr>
-            <a:t>唯一（存储池唯一）</a:t>
+            <a:t>全局唯一（存储池唯一）</a:t>
           </a:r>
           <a:endParaRPr lang="zh-CN" altLang="en-US" sz="1800" kern="1200" dirty="0">
             <a:latin typeface="微软雅黑" panose="020B0503020204020204" pitchFamily="34" charset="-122"/>
@@ -1949,8 +1929,8 @@
         </a:p>
       </dsp:txBody>
       <dsp:txXfrm>
-        <a:off x="1906966" y="0"/>
-        <a:ext cx="4052304" cy="827922"/>
+        <a:off x="2213596" y="0"/>
+        <a:ext cx="4703892" cy="916059"/>
       </dsp:txXfrm>
     </dsp:sp>
     <dsp:sp modelId="{76C231FE-63BD-4250-8947-19410613C694}">
@@ -1960,8 +1940,8 @@
       </dsp:nvSpPr>
       <dsp:spPr>
         <a:xfrm>
-          <a:off x="0" y="945412"/>
-          <a:ext cx="1489817" cy="630798"/>
+          <a:off x="0" y="1048416"/>
+          <a:ext cx="1729372" cy="697950"/>
         </a:xfrm>
         <a:prstGeom prst="rect">
           <a:avLst/>
@@ -2015,8 +1995,8 @@
         </a:p>
       </dsp:txBody>
       <dsp:txXfrm>
-        <a:off x="0" y="945412"/>
-        <a:ext cx="1489817" cy="630798"/>
+        <a:off x="0" y="1048416"/>
+        <a:ext cx="1729372" cy="697950"/>
       </dsp:txXfrm>
     </dsp:sp>
     <dsp:sp modelId="{0915E3EB-0F2E-463B-80CE-FB8054AE4BE8}">
@@ -2026,8 +2006,8 @@
       </dsp:nvSpPr>
       <dsp:spPr>
         <a:xfrm>
-          <a:off x="1489817" y="846850"/>
-          <a:ext cx="297963" cy="827922"/>
+          <a:off x="1729372" y="939361"/>
+          <a:ext cx="345874" cy="916059"/>
         </a:xfrm>
         <a:prstGeom prst="leftBrace">
           <a:avLst>
@@ -2070,8 +2050,8 @@
       </dsp:nvSpPr>
       <dsp:spPr>
         <a:xfrm>
-          <a:off x="1906966" y="846850"/>
-          <a:ext cx="4052304" cy="827922"/>
+          <a:off x="2213596" y="939361"/>
+          <a:ext cx="4703892" cy="916059"/>
         </a:xfrm>
         <a:prstGeom prst="rect">
           <a:avLst/>
@@ -2169,8 +2149,8 @@
         </a:p>
       </dsp:txBody>
       <dsp:txXfrm>
-        <a:off x="1906966" y="846850"/>
-        <a:ext cx="4052304" cy="827922"/>
+        <a:off x="2213596" y="939361"/>
+        <a:ext cx="4703892" cy="916059"/>
       </dsp:txXfrm>
     </dsp:sp>
     <dsp:sp modelId="{0BCC69B1-ABD4-45CB-AAE7-8B985F5BFBF9}">
@@ -2180,8 +2160,8 @@
       </dsp:nvSpPr>
       <dsp:spPr>
         <a:xfrm>
-          <a:off x="0" y="1839001"/>
-          <a:ext cx="1489817" cy="630798"/>
+          <a:off x="0" y="2029697"/>
+          <a:ext cx="1729372" cy="697950"/>
         </a:xfrm>
         <a:prstGeom prst="rect">
           <a:avLst/>
@@ -2235,8 +2215,8 @@
         </a:p>
       </dsp:txBody>
       <dsp:txXfrm>
-        <a:off x="0" y="1839001"/>
-        <a:ext cx="1489817" cy="630798"/>
+        <a:off x="0" y="2029697"/>
+        <a:ext cx="1729372" cy="697950"/>
       </dsp:txXfrm>
     </dsp:sp>
     <dsp:sp modelId="{D437A95D-2B82-4F63-B29F-5D4C8BA3A10B}">
@@ -2246,8 +2226,8 @@
       </dsp:nvSpPr>
       <dsp:spPr>
         <a:xfrm>
-          <a:off x="1489817" y="1691157"/>
-          <a:ext cx="297963" cy="926485"/>
+          <a:off x="1729372" y="1877020"/>
+          <a:ext cx="345874" cy="1003303"/>
         </a:xfrm>
         <a:prstGeom prst="leftBrace">
           <a:avLst>
@@ -2290,8 +2270,8 @@
       </dsp:nvSpPr>
       <dsp:spPr>
         <a:xfrm>
-          <a:off x="1906966" y="1691157"/>
-          <a:ext cx="4052304" cy="926485"/>
+          <a:off x="2213596" y="1877020"/>
+          <a:ext cx="4703892" cy="1003303"/>
         </a:xfrm>
         <a:prstGeom prst="rect">
           <a:avLst/>
@@ -2355,14 +2335,7 @@
               <a:latin typeface="微软雅黑" panose="020B0503020204020204" pitchFamily="34" charset="-122"/>
               <a:ea typeface="微软雅黑" panose="020B0503020204020204" pitchFamily="34" charset="-122"/>
             </a:rPr>
-            <a:t>键值</a:t>
-          </a:r>
-          <a:r>
-            <a:rPr lang="zh-CN" altLang="en-US" sz="2000" kern="1200" dirty="0" smtClean="0">
-              <a:latin typeface="微软雅黑" panose="020B0503020204020204" pitchFamily="34" charset="-122"/>
-              <a:ea typeface="微软雅黑" panose="020B0503020204020204" pitchFamily="34" charset="-122"/>
-            </a:rPr>
-            <a:t>对（</a:t>
+            <a:t>键值对（</a:t>
           </a:r>
           <a:r>
             <a:rPr lang="en-US" altLang="zh-CN" sz="2000" kern="1200" dirty="0" smtClean="0">
@@ -2410,8 +2383,8 @@
         </a:p>
       </dsp:txBody>
       <dsp:txXfrm>
-        <a:off x="1906966" y="1691157"/>
-        <a:ext cx="4052304" cy="926485"/>
+        <a:off x="2213596" y="1877020"/>
+        <a:ext cx="4703892" cy="1003303"/>
       </dsp:txXfrm>
     </dsp:sp>
   </dsp:spTree>
@@ -7436,6 +7409,1689 @@
       </p:grpSpPr>
       <p:sp>
         <p:nvSpPr>
+          <p:cNvPr id="107" name="Rectangle 106"/>
+          <p:cNvSpPr/>
+          <p:nvPr/>
+        </p:nvSpPr>
+        <p:spPr>
+          <a:xfrm>
+            <a:off x="1851949" y="4149323"/>
+            <a:ext cx="7131413" cy="1522428"/>
+          </a:xfrm>
+          <a:prstGeom prst="rect">
+            <a:avLst/>
+          </a:prstGeom>
+          <a:ln w="28575">
+            <a:solidFill>
+              <a:srgbClr val="0070C0"/>
+            </a:solidFill>
+            <a:prstDash val="dash"/>
+          </a:ln>
+        </p:spPr>
+        <p:style>
+          <a:lnRef idx="2">
+            <a:schemeClr val="accent5"/>
+          </a:lnRef>
+          <a:fillRef idx="1">
+            <a:schemeClr val="lt1"/>
+          </a:fillRef>
+          <a:effectRef idx="0">
+            <a:schemeClr val="accent5"/>
+          </a:effectRef>
+          <a:fontRef idx="minor">
+            <a:schemeClr val="dk1"/>
+          </a:fontRef>
+        </p:style>
+        <p:txBody>
+          <a:bodyPr rtlCol="0" anchor="ctr"/>
+          <a:lstStyle/>
+          <a:p>
+            <a:pPr algn="ctr"/>
+            <a:endParaRPr lang="en-US" sz="900" b="1" dirty="0">
+              <a:latin typeface="Microsoft YaHei" charset="-122"/>
+              <a:ea typeface="Microsoft YaHei" charset="-122"/>
+              <a:cs typeface="Microsoft YaHei" charset="-122"/>
+            </a:endParaRPr>
+          </a:p>
+        </p:txBody>
+      </p:sp>
+      <p:sp>
+        <p:nvSpPr>
+          <p:cNvPr id="2" name="Title 1"/>
+          <p:cNvSpPr>
+            <a:spLocks noGrp="1"/>
+          </p:cNvSpPr>
+          <p:nvPr>
+            <p:ph type="title"/>
+          </p:nvPr>
+        </p:nvSpPr>
+        <p:spPr/>
+        <p:txBody>
+          <a:bodyPr/>
+          <a:lstStyle/>
+          <a:p>
+            <a:r>
+              <a:rPr lang="en-US" dirty="0" smtClean="0"/>
+              <a:t>Architecture</a:t>
+            </a:r>
+            <a:endParaRPr lang="en-US" dirty="0"/>
+          </a:p>
+        </p:txBody>
+      </p:sp>
+      <p:grpSp>
+        <p:nvGrpSpPr>
+          <p:cNvPr id="97" name="Group 96"/>
+          <p:cNvGrpSpPr/>
+          <p:nvPr/>
+        </p:nvGrpSpPr>
+        <p:grpSpPr>
+          <a:xfrm>
+            <a:off x="9274037" y="2124343"/>
+            <a:ext cx="1349487" cy="1835812"/>
+            <a:chOff x="8837726" y="1690688"/>
+            <a:chExt cx="1349487" cy="1835812"/>
+          </a:xfrm>
+        </p:grpSpPr>
+        <p:sp>
+          <p:nvSpPr>
+            <p:cNvPr id="4" name="Rectangle 3"/>
+            <p:cNvSpPr/>
+            <p:nvPr/>
+          </p:nvSpPr>
+          <p:spPr>
+            <a:xfrm>
+              <a:off x="8837726" y="1690688"/>
+              <a:ext cx="1349487" cy="1835812"/>
+            </a:xfrm>
+            <a:prstGeom prst="rect">
+              <a:avLst/>
+            </a:prstGeom>
+            <a:ln w="28575">
+              <a:prstDash val="dash"/>
+            </a:ln>
+          </p:spPr>
+          <p:style>
+            <a:lnRef idx="2">
+              <a:schemeClr val="accent5"/>
+            </a:lnRef>
+            <a:fillRef idx="1">
+              <a:schemeClr val="lt1"/>
+            </a:fillRef>
+            <a:effectRef idx="0">
+              <a:schemeClr val="accent5"/>
+            </a:effectRef>
+            <a:fontRef idx="minor">
+              <a:schemeClr val="dk1"/>
+            </a:fontRef>
+          </p:style>
+          <p:txBody>
+            <a:bodyPr rtlCol="0" anchor="ctr"/>
+            <a:lstStyle/>
+            <a:p>
+              <a:pPr algn="ctr"/>
+              <a:endParaRPr lang="en-US" sz="900" b="1" dirty="0">
+                <a:latin typeface="Microsoft YaHei" charset="-122"/>
+                <a:ea typeface="Microsoft YaHei" charset="-122"/>
+                <a:cs typeface="Microsoft YaHei" charset="-122"/>
+              </a:endParaRPr>
+            </a:p>
+          </p:txBody>
+        </p:sp>
+        <p:sp>
+          <p:nvSpPr>
+            <p:cNvPr id="43" name="Rectangle 42"/>
+            <p:cNvSpPr/>
+            <p:nvPr/>
+          </p:nvSpPr>
+          <p:spPr>
+            <a:xfrm>
+              <a:off x="9031696" y="3201813"/>
+              <a:ext cx="961546" cy="229191"/>
+            </a:xfrm>
+            <a:prstGeom prst="rect">
+              <a:avLst/>
+            </a:prstGeom>
+          </p:spPr>
+          <p:style>
+            <a:lnRef idx="2">
+              <a:schemeClr val="accent5">
+                <a:shade val="50000"/>
+              </a:schemeClr>
+            </a:lnRef>
+            <a:fillRef idx="1">
+              <a:schemeClr val="accent5"/>
+            </a:fillRef>
+            <a:effectRef idx="0">
+              <a:schemeClr val="accent5"/>
+            </a:effectRef>
+            <a:fontRef idx="minor">
+              <a:schemeClr val="lt1"/>
+            </a:fontRef>
+          </p:style>
+          <p:txBody>
+            <a:bodyPr rtlCol="0" anchor="ctr"/>
+            <a:lstStyle/>
+            <a:p>
+              <a:pPr algn="ctr"/>
+              <a:r>
+                <a:rPr lang="en-US" sz="900" b="1" dirty="0" smtClean="0">
+                  <a:latin typeface="Microsoft YaHei" charset="-122"/>
+                  <a:ea typeface="Microsoft YaHei" charset="-122"/>
+                  <a:cs typeface="Microsoft YaHei" charset="-122"/>
+                </a:rPr>
+                <a:t>Zookeeper</a:t>
+              </a:r>
+              <a:endParaRPr lang="en-US" sz="900" b="1" dirty="0">
+                <a:latin typeface="Microsoft YaHei" charset="-122"/>
+                <a:ea typeface="Microsoft YaHei" charset="-122"/>
+                <a:cs typeface="Microsoft YaHei" charset="-122"/>
+              </a:endParaRPr>
+            </a:p>
+          </p:txBody>
+        </p:sp>
+        <p:sp>
+          <p:nvSpPr>
+            <p:cNvPr id="44" name="Rectangle 43"/>
+            <p:cNvSpPr/>
+            <p:nvPr/>
+          </p:nvSpPr>
+          <p:spPr>
+            <a:xfrm>
+              <a:off x="9031696" y="2856088"/>
+              <a:ext cx="961546" cy="229191"/>
+            </a:xfrm>
+            <a:prstGeom prst="rect">
+              <a:avLst/>
+            </a:prstGeom>
+          </p:spPr>
+          <p:style>
+            <a:lnRef idx="2">
+              <a:schemeClr val="accent5">
+                <a:shade val="50000"/>
+              </a:schemeClr>
+            </a:lnRef>
+            <a:fillRef idx="1">
+              <a:schemeClr val="accent5"/>
+            </a:fillRef>
+            <a:effectRef idx="0">
+              <a:schemeClr val="accent5"/>
+            </a:effectRef>
+            <a:fontRef idx="minor">
+              <a:schemeClr val="lt1"/>
+            </a:fontRef>
+          </p:style>
+          <p:txBody>
+            <a:bodyPr rtlCol="0" anchor="ctr"/>
+            <a:lstStyle/>
+            <a:p>
+              <a:pPr algn="ctr"/>
+              <a:r>
+                <a:rPr lang="en-US" sz="900" b="1" dirty="0" smtClean="0">
+                  <a:latin typeface="Microsoft YaHei" charset="-122"/>
+                  <a:ea typeface="Microsoft YaHei" charset="-122"/>
+                  <a:cs typeface="Microsoft YaHei" charset="-122"/>
+                </a:rPr>
+                <a:t>Zookeeper</a:t>
+              </a:r>
+              <a:endParaRPr lang="en-US" sz="900" b="1" dirty="0">
+                <a:latin typeface="Microsoft YaHei" charset="-122"/>
+                <a:ea typeface="Microsoft YaHei" charset="-122"/>
+                <a:cs typeface="Microsoft YaHei" charset="-122"/>
+              </a:endParaRPr>
+            </a:p>
+          </p:txBody>
+        </p:sp>
+        <p:sp>
+          <p:nvSpPr>
+            <p:cNvPr id="45" name="Rectangle 44"/>
+            <p:cNvSpPr/>
+            <p:nvPr/>
+          </p:nvSpPr>
+          <p:spPr>
+            <a:xfrm>
+              <a:off x="9031696" y="2510365"/>
+              <a:ext cx="961546" cy="229191"/>
+            </a:xfrm>
+            <a:prstGeom prst="rect">
+              <a:avLst/>
+            </a:prstGeom>
+          </p:spPr>
+          <p:style>
+            <a:lnRef idx="2">
+              <a:schemeClr val="accent5">
+                <a:shade val="50000"/>
+              </a:schemeClr>
+            </a:lnRef>
+            <a:fillRef idx="1">
+              <a:schemeClr val="accent5"/>
+            </a:fillRef>
+            <a:effectRef idx="0">
+              <a:schemeClr val="accent5"/>
+            </a:effectRef>
+            <a:fontRef idx="minor">
+              <a:schemeClr val="lt1"/>
+            </a:fontRef>
+          </p:style>
+          <p:txBody>
+            <a:bodyPr rtlCol="0" anchor="ctr"/>
+            <a:lstStyle/>
+            <a:p>
+              <a:pPr algn="ctr"/>
+              <a:r>
+                <a:rPr lang="en-US" sz="900" b="1" dirty="0" smtClean="0">
+                  <a:latin typeface="Microsoft YaHei" charset="-122"/>
+                  <a:ea typeface="Microsoft YaHei" charset="-122"/>
+                  <a:cs typeface="Microsoft YaHei" charset="-122"/>
+                </a:rPr>
+                <a:t>Zookeeper</a:t>
+              </a:r>
+              <a:endParaRPr lang="en-US" sz="900" b="1" dirty="0">
+                <a:latin typeface="Microsoft YaHei" charset="-122"/>
+                <a:ea typeface="Microsoft YaHei" charset="-122"/>
+                <a:cs typeface="Microsoft YaHei" charset="-122"/>
+              </a:endParaRPr>
+            </a:p>
+          </p:txBody>
+        </p:sp>
+        <p:sp>
+          <p:nvSpPr>
+            <p:cNvPr id="46" name="Rectangle 45"/>
+            <p:cNvSpPr/>
+            <p:nvPr/>
+          </p:nvSpPr>
+          <p:spPr>
+            <a:xfrm>
+              <a:off x="9031696" y="2164642"/>
+              <a:ext cx="961546" cy="229191"/>
+            </a:xfrm>
+            <a:prstGeom prst="rect">
+              <a:avLst/>
+            </a:prstGeom>
+          </p:spPr>
+          <p:style>
+            <a:lnRef idx="2">
+              <a:schemeClr val="accent5">
+                <a:shade val="50000"/>
+              </a:schemeClr>
+            </a:lnRef>
+            <a:fillRef idx="1">
+              <a:schemeClr val="accent5"/>
+            </a:fillRef>
+            <a:effectRef idx="0">
+              <a:schemeClr val="accent5"/>
+            </a:effectRef>
+            <a:fontRef idx="minor">
+              <a:schemeClr val="lt1"/>
+            </a:fontRef>
+          </p:style>
+          <p:txBody>
+            <a:bodyPr rtlCol="0" anchor="ctr"/>
+            <a:lstStyle/>
+            <a:p>
+              <a:pPr algn="ctr"/>
+              <a:r>
+                <a:rPr lang="en-US" sz="900" b="1" dirty="0" smtClean="0">
+                  <a:latin typeface="Microsoft YaHei" charset="-122"/>
+                  <a:ea typeface="Microsoft YaHei" charset="-122"/>
+                  <a:cs typeface="Microsoft YaHei" charset="-122"/>
+                </a:rPr>
+                <a:t>Zookeeper</a:t>
+              </a:r>
+              <a:endParaRPr lang="en-US" sz="900" b="1" dirty="0">
+                <a:latin typeface="Microsoft YaHei" charset="-122"/>
+                <a:ea typeface="Microsoft YaHei" charset="-122"/>
+                <a:cs typeface="Microsoft YaHei" charset="-122"/>
+              </a:endParaRPr>
+            </a:p>
+          </p:txBody>
+        </p:sp>
+        <p:sp>
+          <p:nvSpPr>
+            <p:cNvPr id="47" name="Rectangle 46"/>
+            <p:cNvSpPr/>
+            <p:nvPr/>
+          </p:nvSpPr>
+          <p:spPr>
+            <a:xfrm>
+              <a:off x="9031696" y="1818919"/>
+              <a:ext cx="961546" cy="229191"/>
+            </a:xfrm>
+            <a:prstGeom prst="rect">
+              <a:avLst/>
+            </a:prstGeom>
+          </p:spPr>
+          <p:style>
+            <a:lnRef idx="2">
+              <a:schemeClr val="accent5">
+                <a:shade val="50000"/>
+              </a:schemeClr>
+            </a:lnRef>
+            <a:fillRef idx="1">
+              <a:schemeClr val="accent5"/>
+            </a:fillRef>
+            <a:effectRef idx="0">
+              <a:schemeClr val="accent5"/>
+            </a:effectRef>
+            <a:fontRef idx="minor">
+              <a:schemeClr val="lt1"/>
+            </a:fontRef>
+          </p:style>
+          <p:txBody>
+            <a:bodyPr rtlCol="0" anchor="ctr"/>
+            <a:lstStyle/>
+            <a:p>
+              <a:pPr algn="ctr"/>
+              <a:r>
+                <a:rPr lang="en-US" sz="900" b="1" dirty="0" smtClean="0">
+                  <a:latin typeface="Microsoft YaHei" charset="-122"/>
+                  <a:ea typeface="Microsoft YaHei" charset="-122"/>
+                  <a:cs typeface="Microsoft YaHei" charset="-122"/>
+                </a:rPr>
+                <a:t>Zookeeper</a:t>
+              </a:r>
+              <a:endParaRPr lang="en-US" sz="900" b="1" dirty="0">
+                <a:latin typeface="Microsoft YaHei" charset="-122"/>
+                <a:ea typeface="Microsoft YaHei" charset="-122"/>
+                <a:cs typeface="Microsoft YaHei" charset="-122"/>
+              </a:endParaRPr>
+            </a:p>
+          </p:txBody>
+        </p:sp>
+      </p:grpSp>
+      <p:grpSp>
+        <p:nvGrpSpPr>
+          <p:cNvPr id="83" name="Group 82"/>
+          <p:cNvGrpSpPr/>
+          <p:nvPr/>
+        </p:nvGrpSpPr>
+        <p:grpSpPr>
+          <a:xfrm>
+            <a:off x="2085873" y="4384019"/>
+            <a:ext cx="1939762" cy="1009869"/>
+            <a:chOff x="2063654" y="3145654"/>
+            <a:chExt cx="1655004" cy="849354"/>
+          </a:xfrm>
+        </p:grpSpPr>
+        <p:sp>
+          <p:nvSpPr>
+            <p:cNvPr id="84" name="Rectangle 83"/>
+            <p:cNvSpPr/>
+            <p:nvPr/>
+          </p:nvSpPr>
+          <p:spPr>
+            <a:xfrm>
+              <a:off x="2063654" y="3145654"/>
+              <a:ext cx="1655004" cy="849354"/>
+            </a:xfrm>
+            <a:prstGeom prst="rect">
+              <a:avLst/>
+            </a:prstGeom>
+          </p:spPr>
+          <p:style>
+            <a:lnRef idx="0">
+              <a:schemeClr val="accent1"/>
+            </a:lnRef>
+            <a:fillRef idx="3">
+              <a:schemeClr val="accent1"/>
+            </a:fillRef>
+            <a:effectRef idx="3">
+              <a:schemeClr val="accent1"/>
+            </a:effectRef>
+            <a:fontRef idx="minor">
+              <a:schemeClr val="lt1"/>
+            </a:fontRef>
+          </p:style>
+          <p:txBody>
+            <a:bodyPr rtlCol="0" anchor="ctr"/>
+            <a:lstStyle/>
+            <a:p>
+              <a:pPr algn="ctr"/>
+              <a:endParaRPr lang="en-US" sz="900"/>
+            </a:p>
+          </p:txBody>
+        </p:sp>
+        <p:sp>
+          <p:nvSpPr>
+            <p:cNvPr id="85" name="Rectangle 84"/>
+            <p:cNvSpPr/>
+            <p:nvPr/>
+          </p:nvSpPr>
+          <p:spPr>
+            <a:xfrm>
+              <a:off x="2212130" y="3264864"/>
+              <a:ext cx="1396985" cy="249536"/>
+            </a:xfrm>
+            <a:prstGeom prst="rect">
+              <a:avLst/>
+            </a:prstGeom>
+          </p:spPr>
+          <p:style>
+            <a:lnRef idx="0">
+              <a:schemeClr val="accent4"/>
+            </a:lnRef>
+            <a:fillRef idx="3">
+              <a:schemeClr val="accent4"/>
+            </a:fillRef>
+            <a:effectRef idx="3">
+              <a:schemeClr val="accent4"/>
+            </a:effectRef>
+            <a:fontRef idx="minor">
+              <a:schemeClr val="lt1"/>
+            </a:fontRef>
+          </p:style>
+          <p:txBody>
+            <a:bodyPr rtlCol="0" anchor="ctr"/>
+            <a:lstStyle/>
+            <a:p>
+              <a:pPr algn="ctr"/>
+              <a:r>
+                <a:rPr lang="en-US" altLang="zh-CN" sz="1100" b="1" dirty="0" err="1" smtClean="0">
+                  <a:latin typeface="Microsoft YaHei" charset="-122"/>
+                  <a:ea typeface="Microsoft YaHei" charset="-122"/>
+                  <a:cs typeface="Microsoft YaHei" charset="-122"/>
+                </a:rPr>
+                <a:t>DataNode</a:t>
+              </a:r>
+              <a:endParaRPr lang="en-US" sz="1100" b="1" dirty="0">
+                <a:latin typeface="Microsoft YaHei" charset="-122"/>
+                <a:ea typeface="Microsoft YaHei" charset="-122"/>
+                <a:cs typeface="Microsoft YaHei" charset="-122"/>
+              </a:endParaRPr>
+            </a:p>
+          </p:txBody>
+        </p:sp>
+        <p:sp>
+          <p:nvSpPr>
+            <p:cNvPr id="86" name="Can 85"/>
+            <p:cNvSpPr/>
+            <p:nvPr/>
+          </p:nvSpPr>
+          <p:spPr>
+            <a:xfrm>
+              <a:off x="2245997" y="3607780"/>
+              <a:ext cx="254920" cy="241924"/>
+            </a:xfrm>
+            <a:prstGeom prst="can">
+              <a:avLst/>
+            </a:prstGeom>
+          </p:spPr>
+          <p:style>
+            <a:lnRef idx="2">
+              <a:schemeClr val="accent6">
+                <a:shade val="50000"/>
+              </a:schemeClr>
+            </a:lnRef>
+            <a:fillRef idx="1">
+              <a:schemeClr val="accent6"/>
+            </a:fillRef>
+            <a:effectRef idx="0">
+              <a:schemeClr val="accent6"/>
+            </a:effectRef>
+            <a:fontRef idx="minor">
+              <a:schemeClr val="lt1"/>
+            </a:fontRef>
+          </p:style>
+          <p:txBody>
+            <a:bodyPr rtlCol="0" anchor="ctr"/>
+            <a:lstStyle/>
+            <a:p>
+              <a:pPr algn="ctr"/>
+              <a:endParaRPr lang="en-US" sz="900"/>
+            </a:p>
+          </p:txBody>
+        </p:sp>
+        <p:sp>
+          <p:nvSpPr>
+            <p:cNvPr id="87" name="Can 86"/>
+            <p:cNvSpPr/>
+            <p:nvPr/>
+          </p:nvSpPr>
+          <p:spPr>
+            <a:xfrm>
+              <a:off x="2585979" y="3607780"/>
+              <a:ext cx="254920" cy="241924"/>
+            </a:xfrm>
+            <a:prstGeom prst="can">
+              <a:avLst/>
+            </a:prstGeom>
+          </p:spPr>
+          <p:style>
+            <a:lnRef idx="2">
+              <a:schemeClr val="accent6">
+                <a:shade val="50000"/>
+              </a:schemeClr>
+            </a:lnRef>
+            <a:fillRef idx="1">
+              <a:schemeClr val="accent6"/>
+            </a:fillRef>
+            <a:effectRef idx="0">
+              <a:schemeClr val="accent6"/>
+            </a:effectRef>
+            <a:fontRef idx="minor">
+              <a:schemeClr val="lt1"/>
+            </a:fontRef>
+          </p:style>
+          <p:txBody>
+            <a:bodyPr rtlCol="0" anchor="ctr"/>
+            <a:lstStyle/>
+            <a:p>
+              <a:pPr algn="ctr"/>
+              <a:endParaRPr lang="en-US" sz="900"/>
+            </a:p>
+          </p:txBody>
+        </p:sp>
+        <p:sp>
+          <p:nvSpPr>
+            <p:cNvPr id="88" name="Can 87"/>
+            <p:cNvSpPr/>
+            <p:nvPr/>
+          </p:nvSpPr>
+          <p:spPr>
+            <a:xfrm>
+              <a:off x="3265942" y="3607780"/>
+              <a:ext cx="254920" cy="241924"/>
+            </a:xfrm>
+            <a:prstGeom prst="can">
+              <a:avLst/>
+            </a:prstGeom>
+          </p:spPr>
+          <p:style>
+            <a:lnRef idx="2">
+              <a:schemeClr val="accent6">
+                <a:shade val="50000"/>
+              </a:schemeClr>
+            </a:lnRef>
+            <a:fillRef idx="1">
+              <a:schemeClr val="accent6"/>
+            </a:fillRef>
+            <a:effectRef idx="0">
+              <a:schemeClr val="accent6"/>
+            </a:effectRef>
+            <a:fontRef idx="minor">
+              <a:schemeClr val="lt1"/>
+            </a:fontRef>
+          </p:style>
+          <p:txBody>
+            <a:bodyPr rtlCol="0" anchor="ctr"/>
+            <a:lstStyle/>
+            <a:p>
+              <a:pPr algn="ctr"/>
+              <a:endParaRPr lang="en-US" sz="900"/>
+            </a:p>
+          </p:txBody>
+        </p:sp>
+        <p:sp>
+          <p:nvSpPr>
+            <p:cNvPr id="89" name="Can 88"/>
+            <p:cNvSpPr/>
+            <p:nvPr/>
+          </p:nvSpPr>
+          <p:spPr>
+            <a:xfrm>
+              <a:off x="2925961" y="3607780"/>
+              <a:ext cx="254920" cy="241924"/>
+            </a:xfrm>
+            <a:prstGeom prst="can">
+              <a:avLst/>
+            </a:prstGeom>
+          </p:spPr>
+          <p:style>
+            <a:lnRef idx="2">
+              <a:schemeClr val="accent6">
+                <a:shade val="50000"/>
+              </a:schemeClr>
+            </a:lnRef>
+            <a:fillRef idx="1">
+              <a:schemeClr val="accent6"/>
+            </a:fillRef>
+            <a:effectRef idx="0">
+              <a:schemeClr val="accent6"/>
+            </a:effectRef>
+            <a:fontRef idx="minor">
+              <a:schemeClr val="lt1"/>
+            </a:fontRef>
+          </p:style>
+          <p:txBody>
+            <a:bodyPr rtlCol="0" anchor="ctr"/>
+            <a:lstStyle/>
+            <a:p>
+              <a:pPr algn="ctr"/>
+              <a:endParaRPr lang="en-US" sz="900"/>
+            </a:p>
+          </p:txBody>
+        </p:sp>
+      </p:grpSp>
+      <p:grpSp>
+        <p:nvGrpSpPr>
+          <p:cNvPr id="136" name="Group 135"/>
+          <p:cNvGrpSpPr/>
+          <p:nvPr/>
+        </p:nvGrpSpPr>
+        <p:grpSpPr>
+          <a:xfrm>
+            <a:off x="6560213" y="2363598"/>
+            <a:ext cx="1939762" cy="1382016"/>
+            <a:chOff x="6560213" y="2190600"/>
+            <a:chExt cx="1939762" cy="1382016"/>
+          </a:xfrm>
+        </p:grpSpPr>
+        <p:sp>
+          <p:nvSpPr>
+            <p:cNvPr id="106" name="Rectangle 105"/>
+            <p:cNvSpPr/>
+            <p:nvPr/>
+          </p:nvSpPr>
+          <p:spPr>
+            <a:xfrm>
+              <a:off x="6560213" y="2190600"/>
+              <a:ext cx="1939762" cy="1382016"/>
+            </a:xfrm>
+            <a:prstGeom prst="rect">
+              <a:avLst/>
+            </a:prstGeom>
+            <a:ln w="28575">
+              <a:solidFill>
+                <a:srgbClr val="C00000"/>
+              </a:solidFill>
+              <a:prstDash val="dash"/>
+            </a:ln>
+          </p:spPr>
+          <p:style>
+            <a:lnRef idx="2">
+              <a:schemeClr val="accent5"/>
+            </a:lnRef>
+            <a:fillRef idx="1">
+              <a:schemeClr val="lt1"/>
+            </a:fillRef>
+            <a:effectRef idx="0">
+              <a:schemeClr val="accent5"/>
+            </a:effectRef>
+            <a:fontRef idx="minor">
+              <a:schemeClr val="dk1"/>
+            </a:fontRef>
+          </p:style>
+          <p:txBody>
+            <a:bodyPr rtlCol="0" anchor="ctr"/>
+            <a:lstStyle/>
+            <a:p>
+              <a:pPr algn="ctr"/>
+              <a:endParaRPr lang="en-US" sz="900" b="1" dirty="0">
+                <a:latin typeface="Microsoft YaHei" charset="-122"/>
+                <a:ea typeface="Microsoft YaHei" charset="-122"/>
+                <a:cs typeface="Microsoft YaHei" charset="-122"/>
+              </a:endParaRPr>
+            </a:p>
+          </p:txBody>
+        </p:sp>
+        <p:sp>
+          <p:nvSpPr>
+            <p:cNvPr id="91" name="Rectangle 90"/>
+            <p:cNvSpPr/>
+            <p:nvPr/>
+          </p:nvSpPr>
+          <p:spPr>
+            <a:xfrm>
+              <a:off x="6716582" y="2378323"/>
+              <a:ext cx="1655004" cy="375478"/>
+            </a:xfrm>
+            <a:prstGeom prst="rect">
+              <a:avLst/>
+            </a:prstGeom>
+          </p:spPr>
+          <p:style>
+            <a:lnRef idx="0">
+              <a:schemeClr val="accent2"/>
+            </a:lnRef>
+            <a:fillRef idx="3">
+              <a:schemeClr val="accent2"/>
+            </a:fillRef>
+            <a:effectRef idx="3">
+              <a:schemeClr val="accent2"/>
+            </a:effectRef>
+            <a:fontRef idx="minor">
+              <a:schemeClr val="lt1"/>
+            </a:fontRef>
+          </p:style>
+          <p:txBody>
+            <a:bodyPr rtlCol="0" anchor="ctr"/>
+            <a:lstStyle/>
+            <a:p>
+              <a:pPr algn="ctr"/>
+              <a:r>
+                <a:rPr lang="en-US" sz="1100" b="1" dirty="0" err="1" smtClean="0">
+                  <a:latin typeface="Microsoft YaHei" charset="-122"/>
+                  <a:ea typeface="Microsoft YaHei" charset="-122"/>
+                  <a:cs typeface="Microsoft YaHei" charset="-122"/>
+                </a:rPr>
+                <a:t>NameNode</a:t>
+              </a:r>
+              <a:endParaRPr lang="en-US" sz="1100" b="1" dirty="0">
+                <a:latin typeface="Microsoft YaHei" charset="-122"/>
+                <a:ea typeface="Microsoft YaHei" charset="-122"/>
+                <a:cs typeface="Microsoft YaHei" charset="-122"/>
+              </a:endParaRPr>
+            </a:p>
+          </p:txBody>
+        </p:sp>
+        <p:sp>
+          <p:nvSpPr>
+            <p:cNvPr id="98" name="Rectangle 97"/>
+            <p:cNvSpPr/>
+            <p:nvPr/>
+          </p:nvSpPr>
+          <p:spPr>
+            <a:xfrm>
+              <a:off x="6716582" y="2949758"/>
+              <a:ext cx="1655004" cy="375478"/>
+            </a:xfrm>
+            <a:prstGeom prst="rect">
+              <a:avLst/>
+            </a:prstGeom>
+          </p:spPr>
+          <p:style>
+            <a:lnRef idx="2">
+              <a:schemeClr val="accent2"/>
+            </a:lnRef>
+            <a:fillRef idx="1">
+              <a:schemeClr val="lt1"/>
+            </a:fillRef>
+            <a:effectRef idx="0">
+              <a:schemeClr val="accent2"/>
+            </a:effectRef>
+            <a:fontRef idx="minor">
+              <a:schemeClr val="dk1"/>
+            </a:fontRef>
+          </p:style>
+          <p:txBody>
+            <a:bodyPr rtlCol="0" anchor="ctr"/>
+            <a:lstStyle/>
+            <a:p>
+              <a:pPr algn="ctr"/>
+              <a:r>
+                <a:rPr lang="en-US" sz="1100" b="1" smtClean="0">
+                  <a:latin typeface="Microsoft YaHei" charset="-122"/>
+                  <a:ea typeface="Microsoft YaHei" charset="-122"/>
+                  <a:cs typeface="Microsoft YaHei" charset="-122"/>
+                </a:rPr>
+                <a:t>NameNode</a:t>
+              </a:r>
+              <a:endParaRPr lang="en-US" sz="1100" b="1" dirty="0">
+                <a:latin typeface="Microsoft YaHei" charset="-122"/>
+                <a:ea typeface="Microsoft YaHei" charset="-122"/>
+                <a:cs typeface="Microsoft YaHei" charset="-122"/>
+              </a:endParaRPr>
+            </a:p>
+          </p:txBody>
+        </p:sp>
+      </p:grpSp>
+      <p:grpSp>
+        <p:nvGrpSpPr>
+          <p:cNvPr id="134" name="Group 133"/>
+          <p:cNvGrpSpPr/>
+          <p:nvPr/>
+        </p:nvGrpSpPr>
+        <p:grpSpPr>
+          <a:xfrm>
+            <a:off x="3245938" y="1621844"/>
+            <a:ext cx="1856632" cy="807980"/>
+            <a:chOff x="2739244" y="2112025"/>
+            <a:chExt cx="1856632" cy="807980"/>
+          </a:xfrm>
+        </p:grpSpPr>
+        <p:sp>
+          <p:nvSpPr>
+            <p:cNvPr id="108" name="Rectangle 107"/>
+            <p:cNvSpPr/>
+            <p:nvPr/>
+          </p:nvSpPr>
+          <p:spPr>
+            <a:xfrm>
+              <a:off x="2739244" y="2112025"/>
+              <a:ext cx="1856632" cy="807980"/>
+            </a:xfrm>
+            <a:prstGeom prst="rect">
+              <a:avLst/>
+            </a:prstGeom>
+          </p:spPr>
+          <p:style>
+            <a:lnRef idx="0">
+              <a:schemeClr val="accent3"/>
+            </a:lnRef>
+            <a:fillRef idx="3">
+              <a:schemeClr val="accent3"/>
+            </a:fillRef>
+            <a:effectRef idx="3">
+              <a:schemeClr val="accent3"/>
+            </a:effectRef>
+            <a:fontRef idx="minor">
+              <a:schemeClr val="lt1"/>
+            </a:fontRef>
+          </p:style>
+          <p:txBody>
+            <a:bodyPr rtlCol="0" anchor="ctr"/>
+            <a:lstStyle/>
+            <a:p>
+              <a:pPr algn="ctr"/>
+              <a:endParaRPr lang="en-US"/>
+            </a:p>
+          </p:txBody>
+        </p:sp>
+        <p:sp>
+          <p:nvSpPr>
+            <p:cNvPr id="109" name="Rectangle 108"/>
+            <p:cNvSpPr/>
+            <p:nvPr/>
+          </p:nvSpPr>
+          <p:spPr>
+            <a:xfrm>
+              <a:off x="3055755" y="2293088"/>
+              <a:ext cx="1217741" cy="229191"/>
+            </a:xfrm>
+            <a:prstGeom prst="rect">
+              <a:avLst/>
+            </a:prstGeom>
+          </p:spPr>
+          <p:style>
+            <a:lnRef idx="2">
+              <a:schemeClr val="accent6">
+                <a:shade val="50000"/>
+              </a:schemeClr>
+            </a:lnRef>
+            <a:fillRef idx="1">
+              <a:schemeClr val="accent6"/>
+            </a:fillRef>
+            <a:effectRef idx="0">
+              <a:schemeClr val="accent6"/>
+            </a:effectRef>
+            <a:fontRef idx="minor">
+              <a:schemeClr val="lt1"/>
+            </a:fontRef>
+          </p:style>
+          <p:txBody>
+            <a:bodyPr rtlCol="0" anchor="ctr"/>
+            <a:lstStyle/>
+            <a:p>
+              <a:pPr algn="ctr"/>
+              <a:r>
+                <a:rPr lang="en-US" sz="1100" dirty="0" smtClean="0">
+                  <a:latin typeface="Microsoft YaHei" charset="-122"/>
+                  <a:ea typeface="Microsoft YaHei" charset="-122"/>
+                  <a:cs typeface="Microsoft YaHei" charset="-122"/>
+                </a:rPr>
+                <a:t>App</a:t>
+              </a:r>
+              <a:endParaRPr lang="en-US" sz="1100" dirty="0">
+                <a:latin typeface="Microsoft YaHei" charset="-122"/>
+                <a:ea typeface="Microsoft YaHei" charset="-122"/>
+                <a:cs typeface="Microsoft YaHei" charset="-122"/>
+              </a:endParaRPr>
+            </a:p>
+          </p:txBody>
+        </p:sp>
+        <p:sp>
+          <p:nvSpPr>
+            <p:cNvPr id="110" name="Rectangle 109"/>
+            <p:cNvSpPr/>
+            <p:nvPr/>
+          </p:nvSpPr>
+          <p:spPr>
+            <a:xfrm>
+              <a:off x="3055754" y="2525283"/>
+              <a:ext cx="1217741" cy="229191"/>
+            </a:xfrm>
+            <a:prstGeom prst="rect">
+              <a:avLst/>
+            </a:prstGeom>
+          </p:spPr>
+          <p:style>
+            <a:lnRef idx="2">
+              <a:schemeClr val="accent5">
+                <a:shade val="50000"/>
+              </a:schemeClr>
+            </a:lnRef>
+            <a:fillRef idx="1">
+              <a:schemeClr val="accent5"/>
+            </a:fillRef>
+            <a:effectRef idx="0">
+              <a:schemeClr val="accent5"/>
+            </a:effectRef>
+            <a:fontRef idx="minor">
+              <a:schemeClr val="lt1"/>
+            </a:fontRef>
+          </p:style>
+          <p:txBody>
+            <a:bodyPr rtlCol="0" anchor="ctr"/>
+            <a:lstStyle/>
+            <a:p>
+              <a:pPr algn="ctr"/>
+              <a:r>
+                <a:rPr lang="en-US" sz="1100" smtClean="0">
+                  <a:latin typeface="Microsoft YaHei" charset="-122"/>
+                  <a:ea typeface="Microsoft YaHei" charset="-122"/>
+                  <a:cs typeface="Microsoft YaHei" charset="-122"/>
+                </a:rPr>
+                <a:t>SDK</a:t>
+              </a:r>
+              <a:endParaRPr lang="en-US" sz="1100" dirty="0">
+                <a:latin typeface="Microsoft YaHei" charset="-122"/>
+                <a:ea typeface="Microsoft YaHei" charset="-122"/>
+                <a:cs typeface="Microsoft YaHei" charset="-122"/>
+              </a:endParaRPr>
+            </a:p>
+          </p:txBody>
+        </p:sp>
+      </p:grpSp>
+      <p:cxnSp>
+        <p:nvCxnSpPr>
+          <p:cNvPr id="112" name="Straight Arrow Connector 111"/>
+          <p:cNvCxnSpPr>
+            <a:stCxn id="106" idx="2"/>
+          </p:cNvCxnSpPr>
+          <p:nvPr/>
+        </p:nvCxnSpPr>
+        <p:spPr>
+          <a:xfrm>
+            <a:off x="7530094" y="3745614"/>
+            <a:ext cx="0" cy="403709"/>
+          </a:xfrm>
+          <a:prstGeom prst="straightConnector1">
+            <a:avLst/>
+          </a:prstGeom>
+          <a:ln w="38100">
+            <a:headEnd type="triangle"/>
+            <a:tailEnd type="triangle"/>
+          </a:ln>
+        </p:spPr>
+        <p:style>
+          <a:lnRef idx="3">
+            <a:schemeClr val="accent2"/>
+          </a:lnRef>
+          <a:fillRef idx="0">
+            <a:schemeClr val="accent2"/>
+          </a:fillRef>
+          <a:effectRef idx="2">
+            <a:schemeClr val="accent2"/>
+          </a:effectRef>
+          <a:fontRef idx="minor">
+            <a:schemeClr val="tx1"/>
+          </a:fontRef>
+        </p:style>
+      </p:cxnSp>
+      <p:cxnSp>
+        <p:nvCxnSpPr>
+          <p:cNvPr id="113" name="Straight Arrow Connector 112"/>
+          <p:cNvCxnSpPr>
+            <a:stCxn id="108" idx="3"/>
+            <a:endCxn id="106" idx="1"/>
+          </p:cNvCxnSpPr>
+          <p:nvPr/>
+        </p:nvCxnSpPr>
+        <p:spPr>
+          <a:xfrm>
+            <a:off x="5102570" y="2025834"/>
+            <a:ext cx="1457643" cy="1028772"/>
+          </a:xfrm>
+          <a:prstGeom prst="straightConnector1">
+            <a:avLst/>
+          </a:prstGeom>
+          <a:ln w="38100">
+            <a:headEnd type="triangle"/>
+            <a:tailEnd type="triangle"/>
+          </a:ln>
+        </p:spPr>
+        <p:style>
+          <a:lnRef idx="3">
+            <a:schemeClr val="accent2"/>
+          </a:lnRef>
+          <a:fillRef idx="0">
+            <a:schemeClr val="accent2"/>
+          </a:fillRef>
+          <a:effectRef idx="2">
+            <a:schemeClr val="accent2"/>
+          </a:effectRef>
+          <a:fontRef idx="minor">
+            <a:schemeClr val="tx1"/>
+          </a:fontRef>
+        </p:style>
+      </p:cxnSp>
+      <p:cxnSp>
+        <p:nvCxnSpPr>
+          <p:cNvPr id="116" name="Straight Arrow Connector 115"/>
+          <p:cNvCxnSpPr>
+            <a:stCxn id="106" idx="3"/>
+            <a:endCxn id="4" idx="1"/>
+          </p:cNvCxnSpPr>
+          <p:nvPr/>
+        </p:nvCxnSpPr>
+        <p:spPr>
+          <a:xfrm flipV="1">
+            <a:off x="8499975" y="3042249"/>
+            <a:ext cx="774062" cy="12357"/>
+          </a:xfrm>
+          <a:prstGeom prst="straightConnector1">
+            <a:avLst/>
+          </a:prstGeom>
+          <a:ln w="38100">
+            <a:solidFill>
+              <a:schemeClr val="accent5"/>
+            </a:solidFill>
+            <a:headEnd type="triangle"/>
+            <a:tailEnd type="triangle"/>
+          </a:ln>
+        </p:spPr>
+        <p:style>
+          <a:lnRef idx="3">
+            <a:schemeClr val="accent2"/>
+          </a:lnRef>
+          <a:fillRef idx="0">
+            <a:schemeClr val="accent2"/>
+          </a:fillRef>
+          <a:effectRef idx="2">
+            <a:schemeClr val="accent2"/>
+          </a:effectRef>
+          <a:fontRef idx="minor">
+            <a:schemeClr val="tx1"/>
+          </a:fontRef>
+        </p:style>
+      </p:cxnSp>
+      <p:grpSp>
+        <p:nvGrpSpPr>
+          <p:cNvPr id="119" name="Group 118"/>
+          <p:cNvGrpSpPr/>
+          <p:nvPr/>
+        </p:nvGrpSpPr>
+        <p:grpSpPr>
+          <a:xfrm>
+            <a:off x="4403231" y="4384019"/>
+            <a:ext cx="1939762" cy="1009869"/>
+            <a:chOff x="2063654" y="3145654"/>
+            <a:chExt cx="1655004" cy="849354"/>
+          </a:xfrm>
+        </p:grpSpPr>
+        <p:sp>
+          <p:nvSpPr>
+            <p:cNvPr id="120" name="Rectangle 119"/>
+            <p:cNvSpPr/>
+            <p:nvPr/>
+          </p:nvSpPr>
+          <p:spPr>
+            <a:xfrm>
+              <a:off x="2063654" y="3145654"/>
+              <a:ext cx="1655004" cy="849354"/>
+            </a:xfrm>
+            <a:prstGeom prst="rect">
+              <a:avLst/>
+            </a:prstGeom>
+          </p:spPr>
+          <p:style>
+            <a:lnRef idx="0">
+              <a:schemeClr val="accent1"/>
+            </a:lnRef>
+            <a:fillRef idx="3">
+              <a:schemeClr val="accent1"/>
+            </a:fillRef>
+            <a:effectRef idx="3">
+              <a:schemeClr val="accent1"/>
+            </a:effectRef>
+            <a:fontRef idx="minor">
+              <a:schemeClr val="lt1"/>
+            </a:fontRef>
+          </p:style>
+          <p:txBody>
+            <a:bodyPr rtlCol="0" anchor="ctr"/>
+            <a:lstStyle/>
+            <a:p>
+              <a:pPr algn="ctr"/>
+              <a:endParaRPr lang="en-US" sz="900"/>
+            </a:p>
+          </p:txBody>
+        </p:sp>
+        <p:sp>
+          <p:nvSpPr>
+            <p:cNvPr id="121" name="Rectangle 120"/>
+            <p:cNvSpPr/>
+            <p:nvPr/>
+          </p:nvSpPr>
+          <p:spPr>
+            <a:xfrm>
+              <a:off x="2212130" y="3264864"/>
+              <a:ext cx="1396985" cy="249536"/>
+            </a:xfrm>
+            <a:prstGeom prst="rect">
+              <a:avLst/>
+            </a:prstGeom>
+          </p:spPr>
+          <p:style>
+            <a:lnRef idx="0">
+              <a:schemeClr val="accent4"/>
+            </a:lnRef>
+            <a:fillRef idx="3">
+              <a:schemeClr val="accent4"/>
+            </a:fillRef>
+            <a:effectRef idx="3">
+              <a:schemeClr val="accent4"/>
+            </a:effectRef>
+            <a:fontRef idx="minor">
+              <a:schemeClr val="lt1"/>
+            </a:fontRef>
+          </p:style>
+          <p:txBody>
+            <a:bodyPr rtlCol="0" anchor="ctr"/>
+            <a:lstStyle/>
+            <a:p>
+              <a:pPr algn="ctr"/>
+              <a:r>
+                <a:rPr lang="en-US" altLang="zh-CN" sz="1100" b="1" dirty="0" err="1" smtClean="0">
+                  <a:latin typeface="Microsoft YaHei" charset="-122"/>
+                  <a:ea typeface="Microsoft YaHei" charset="-122"/>
+                  <a:cs typeface="Microsoft YaHei" charset="-122"/>
+                </a:rPr>
+                <a:t>DataNode</a:t>
+              </a:r>
+              <a:endParaRPr lang="en-US" sz="1100" b="1" dirty="0">
+                <a:latin typeface="Microsoft YaHei" charset="-122"/>
+                <a:ea typeface="Microsoft YaHei" charset="-122"/>
+                <a:cs typeface="Microsoft YaHei" charset="-122"/>
+              </a:endParaRPr>
+            </a:p>
+          </p:txBody>
+        </p:sp>
+        <p:sp>
+          <p:nvSpPr>
+            <p:cNvPr id="122" name="Can 121"/>
+            <p:cNvSpPr/>
+            <p:nvPr/>
+          </p:nvSpPr>
+          <p:spPr>
+            <a:xfrm>
+              <a:off x="2245997" y="3607780"/>
+              <a:ext cx="254920" cy="241924"/>
+            </a:xfrm>
+            <a:prstGeom prst="can">
+              <a:avLst/>
+            </a:prstGeom>
+          </p:spPr>
+          <p:style>
+            <a:lnRef idx="2">
+              <a:schemeClr val="accent6">
+                <a:shade val="50000"/>
+              </a:schemeClr>
+            </a:lnRef>
+            <a:fillRef idx="1">
+              <a:schemeClr val="accent6"/>
+            </a:fillRef>
+            <a:effectRef idx="0">
+              <a:schemeClr val="accent6"/>
+            </a:effectRef>
+            <a:fontRef idx="minor">
+              <a:schemeClr val="lt1"/>
+            </a:fontRef>
+          </p:style>
+          <p:txBody>
+            <a:bodyPr rtlCol="0" anchor="ctr"/>
+            <a:lstStyle/>
+            <a:p>
+              <a:pPr algn="ctr"/>
+              <a:endParaRPr lang="en-US" sz="900"/>
+            </a:p>
+          </p:txBody>
+        </p:sp>
+        <p:sp>
+          <p:nvSpPr>
+            <p:cNvPr id="123" name="Can 122"/>
+            <p:cNvSpPr/>
+            <p:nvPr/>
+          </p:nvSpPr>
+          <p:spPr>
+            <a:xfrm>
+              <a:off x="2585979" y="3607780"/>
+              <a:ext cx="254920" cy="241924"/>
+            </a:xfrm>
+            <a:prstGeom prst="can">
+              <a:avLst/>
+            </a:prstGeom>
+          </p:spPr>
+          <p:style>
+            <a:lnRef idx="2">
+              <a:schemeClr val="accent6">
+                <a:shade val="50000"/>
+              </a:schemeClr>
+            </a:lnRef>
+            <a:fillRef idx="1">
+              <a:schemeClr val="accent6"/>
+            </a:fillRef>
+            <a:effectRef idx="0">
+              <a:schemeClr val="accent6"/>
+            </a:effectRef>
+            <a:fontRef idx="minor">
+              <a:schemeClr val="lt1"/>
+            </a:fontRef>
+          </p:style>
+          <p:txBody>
+            <a:bodyPr rtlCol="0" anchor="ctr"/>
+            <a:lstStyle/>
+            <a:p>
+              <a:pPr algn="ctr"/>
+              <a:endParaRPr lang="en-US" sz="900"/>
+            </a:p>
+          </p:txBody>
+        </p:sp>
+        <p:sp>
+          <p:nvSpPr>
+            <p:cNvPr id="124" name="Can 123"/>
+            <p:cNvSpPr/>
+            <p:nvPr/>
+          </p:nvSpPr>
+          <p:spPr>
+            <a:xfrm>
+              <a:off x="3265942" y="3607780"/>
+              <a:ext cx="254920" cy="241924"/>
+            </a:xfrm>
+            <a:prstGeom prst="can">
+              <a:avLst/>
+            </a:prstGeom>
+          </p:spPr>
+          <p:style>
+            <a:lnRef idx="2">
+              <a:schemeClr val="accent6">
+                <a:shade val="50000"/>
+              </a:schemeClr>
+            </a:lnRef>
+            <a:fillRef idx="1">
+              <a:schemeClr val="accent6"/>
+            </a:fillRef>
+            <a:effectRef idx="0">
+              <a:schemeClr val="accent6"/>
+            </a:effectRef>
+            <a:fontRef idx="minor">
+              <a:schemeClr val="lt1"/>
+            </a:fontRef>
+          </p:style>
+          <p:txBody>
+            <a:bodyPr rtlCol="0" anchor="ctr"/>
+            <a:lstStyle/>
+            <a:p>
+              <a:pPr algn="ctr"/>
+              <a:endParaRPr lang="en-US" sz="900"/>
+            </a:p>
+          </p:txBody>
+        </p:sp>
+        <p:sp>
+          <p:nvSpPr>
+            <p:cNvPr id="125" name="Can 124"/>
+            <p:cNvSpPr/>
+            <p:nvPr/>
+          </p:nvSpPr>
+          <p:spPr>
+            <a:xfrm>
+              <a:off x="2925961" y="3607780"/>
+              <a:ext cx="254920" cy="241924"/>
+            </a:xfrm>
+            <a:prstGeom prst="can">
+              <a:avLst/>
+            </a:prstGeom>
+          </p:spPr>
+          <p:style>
+            <a:lnRef idx="2">
+              <a:schemeClr val="accent6">
+                <a:shade val="50000"/>
+              </a:schemeClr>
+            </a:lnRef>
+            <a:fillRef idx="1">
+              <a:schemeClr val="accent6"/>
+            </a:fillRef>
+            <a:effectRef idx="0">
+              <a:schemeClr val="accent6"/>
+            </a:effectRef>
+            <a:fontRef idx="minor">
+              <a:schemeClr val="lt1"/>
+            </a:fontRef>
+          </p:style>
+          <p:txBody>
+            <a:bodyPr rtlCol="0" anchor="ctr"/>
+            <a:lstStyle/>
+            <a:p>
+              <a:pPr algn="ctr"/>
+              <a:endParaRPr lang="en-US" sz="900"/>
+            </a:p>
+          </p:txBody>
+        </p:sp>
+      </p:grpSp>
+      <p:grpSp>
+        <p:nvGrpSpPr>
+          <p:cNvPr id="126" name="Group 125"/>
+          <p:cNvGrpSpPr/>
+          <p:nvPr/>
+        </p:nvGrpSpPr>
+        <p:grpSpPr>
+          <a:xfrm>
+            <a:off x="6720589" y="4384019"/>
+            <a:ext cx="1939762" cy="1009869"/>
+            <a:chOff x="2063654" y="3145654"/>
+            <a:chExt cx="1655004" cy="849354"/>
+          </a:xfrm>
+        </p:grpSpPr>
+        <p:sp>
+          <p:nvSpPr>
+            <p:cNvPr id="127" name="Rectangle 126"/>
+            <p:cNvSpPr/>
+            <p:nvPr/>
+          </p:nvSpPr>
+          <p:spPr>
+            <a:xfrm>
+              <a:off x="2063654" y="3145654"/>
+              <a:ext cx="1655004" cy="849354"/>
+            </a:xfrm>
+            <a:prstGeom prst="rect">
+              <a:avLst/>
+            </a:prstGeom>
+          </p:spPr>
+          <p:style>
+            <a:lnRef idx="0">
+              <a:schemeClr val="accent1"/>
+            </a:lnRef>
+            <a:fillRef idx="3">
+              <a:schemeClr val="accent1"/>
+            </a:fillRef>
+            <a:effectRef idx="3">
+              <a:schemeClr val="accent1"/>
+            </a:effectRef>
+            <a:fontRef idx="minor">
+              <a:schemeClr val="lt1"/>
+            </a:fontRef>
+          </p:style>
+          <p:txBody>
+            <a:bodyPr rtlCol="0" anchor="ctr"/>
+            <a:lstStyle/>
+            <a:p>
+              <a:pPr algn="ctr"/>
+              <a:endParaRPr lang="en-US" sz="900"/>
+            </a:p>
+          </p:txBody>
+        </p:sp>
+        <p:sp>
+          <p:nvSpPr>
+            <p:cNvPr id="128" name="Rectangle 127"/>
+            <p:cNvSpPr/>
+            <p:nvPr/>
+          </p:nvSpPr>
+          <p:spPr>
+            <a:xfrm>
+              <a:off x="2212130" y="3264864"/>
+              <a:ext cx="1396985" cy="249536"/>
+            </a:xfrm>
+            <a:prstGeom prst="rect">
+              <a:avLst/>
+            </a:prstGeom>
+          </p:spPr>
+          <p:style>
+            <a:lnRef idx="0">
+              <a:schemeClr val="accent4"/>
+            </a:lnRef>
+            <a:fillRef idx="3">
+              <a:schemeClr val="accent4"/>
+            </a:fillRef>
+            <a:effectRef idx="3">
+              <a:schemeClr val="accent4"/>
+            </a:effectRef>
+            <a:fontRef idx="minor">
+              <a:schemeClr val="lt1"/>
+            </a:fontRef>
+          </p:style>
+          <p:txBody>
+            <a:bodyPr rtlCol="0" anchor="ctr"/>
+            <a:lstStyle/>
+            <a:p>
+              <a:pPr algn="ctr"/>
+              <a:r>
+                <a:rPr lang="en-US" altLang="zh-CN" sz="1100" b="1" dirty="0" err="1" smtClean="0">
+                  <a:latin typeface="Microsoft YaHei" charset="-122"/>
+                  <a:ea typeface="Microsoft YaHei" charset="-122"/>
+                  <a:cs typeface="Microsoft YaHei" charset="-122"/>
+                </a:rPr>
+                <a:t>DataNode</a:t>
+              </a:r>
+              <a:endParaRPr lang="en-US" sz="1100" b="1" dirty="0">
+                <a:latin typeface="Microsoft YaHei" charset="-122"/>
+                <a:ea typeface="Microsoft YaHei" charset="-122"/>
+                <a:cs typeface="Microsoft YaHei" charset="-122"/>
+              </a:endParaRPr>
+            </a:p>
+          </p:txBody>
+        </p:sp>
+        <p:sp>
+          <p:nvSpPr>
+            <p:cNvPr id="129" name="Can 128"/>
+            <p:cNvSpPr/>
+            <p:nvPr/>
+          </p:nvSpPr>
+          <p:spPr>
+            <a:xfrm>
+              <a:off x="2245997" y="3607780"/>
+              <a:ext cx="254920" cy="241924"/>
+            </a:xfrm>
+            <a:prstGeom prst="can">
+              <a:avLst/>
+            </a:prstGeom>
+          </p:spPr>
+          <p:style>
+            <a:lnRef idx="2">
+              <a:schemeClr val="accent6">
+                <a:shade val="50000"/>
+              </a:schemeClr>
+            </a:lnRef>
+            <a:fillRef idx="1">
+              <a:schemeClr val="accent6"/>
+            </a:fillRef>
+            <a:effectRef idx="0">
+              <a:schemeClr val="accent6"/>
+            </a:effectRef>
+            <a:fontRef idx="minor">
+              <a:schemeClr val="lt1"/>
+            </a:fontRef>
+          </p:style>
+          <p:txBody>
+            <a:bodyPr rtlCol="0" anchor="ctr"/>
+            <a:lstStyle/>
+            <a:p>
+              <a:pPr algn="ctr"/>
+              <a:endParaRPr lang="en-US" sz="900"/>
+            </a:p>
+          </p:txBody>
+        </p:sp>
+        <p:sp>
+          <p:nvSpPr>
+            <p:cNvPr id="130" name="Can 129"/>
+            <p:cNvSpPr/>
+            <p:nvPr/>
+          </p:nvSpPr>
+          <p:spPr>
+            <a:xfrm>
+              <a:off x="2585979" y="3607780"/>
+              <a:ext cx="254920" cy="241924"/>
+            </a:xfrm>
+            <a:prstGeom prst="can">
+              <a:avLst/>
+            </a:prstGeom>
+          </p:spPr>
+          <p:style>
+            <a:lnRef idx="2">
+              <a:schemeClr val="accent6">
+                <a:shade val="50000"/>
+              </a:schemeClr>
+            </a:lnRef>
+            <a:fillRef idx="1">
+              <a:schemeClr val="accent6"/>
+            </a:fillRef>
+            <a:effectRef idx="0">
+              <a:schemeClr val="accent6"/>
+            </a:effectRef>
+            <a:fontRef idx="minor">
+              <a:schemeClr val="lt1"/>
+            </a:fontRef>
+          </p:style>
+          <p:txBody>
+            <a:bodyPr rtlCol="0" anchor="ctr"/>
+            <a:lstStyle/>
+            <a:p>
+              <a:pPr algn="ctr"/>
+              <a:endParaRPr lang="en-US" sz="900"/>
+            </a:p>
+          </p:txBody>
+        </p:sp>
+        <p:sp>
+          <p:nvSpPr>
+            <p:cNvPr id="131" name="Can 130"/>
+            <p:cNvSpPr/>
+            <p:nvPr/>
+          </p:nvSpPr>
+          <p:spPr>
+            <a:xfrm>
+              <a:off x="3265942" y="3607780"/>
+              <a:ext cx="254920" cy="241924"/>
+            </a:xfrm>
+            <a:prstGeom prst="can">
+              <a:avLst/>
+            </a:prstGeom>
+          </p:spPr>
+          <p:style>
+            <a:lnRef idx="2">
+              <a:schemeClr val="accent6">
+                <a:shade val="50000"/>
+              </a:schemeClr>
+            </a:lnRef>
+            <a:fillRef idx="1">
+              <a:schemeClr val="accent6"/>
+            </a:fillRef>
+            <a:effectRef idx="0">
+              <a:schemeClr val="accent6"/>
+            </a:effectRef>
+            <a:fontRef idx="minor">
+              <a:schemeClr val="lt1"/>
+            </a:fontRef>
+          </p:style>
+          <p:txBody>
+            <a:bodyPr rtlCol="0" anchor="ctr"/>
+            <a:lstStyle/>
+            <a:p>
+              <a:pPr algn="ctr"/>
+              <a:endParaRPr lang="en-US" sz="900"/>
+            </a:p>
+          </p:txBody>
+        </p:sp>
+        <p:sp>
+          <p:nvSpPr>
+            <p:cNvPr id="132" name="Can 131"/>
+            <p:cNvSpPr/>
+            <p:nvPr/>
+          </p:nvSpPr>
+          <p:spPr>
+            <a:xfrm>
+              <a:off x="2925961" y="3607780"/>
+              <a:ext cx="254920" cy="241924"/>
+            </a:xfrm>
+            <a:prstGeom prst="can">
+              <a:avLst/>
+            </a:prstGeom>
+          </p:spPr>
+          <p:style>
+            <a:lnRef idx="2">
+              <a:schemeClr val="accent6">
+                <a:shade val="50000"/>
+              </a:schemeClr>
+            </a:lnRef>
+            <a:fillRef idx="1">
+              <a:schemeClr val="accent6"/>
+            </a:fillRef>
+            <a:effectRef idx="0">
+              <a:schemeClr val="accent6"/>
+            </a:effectRef>
+            <a:fontRef idx="minor">
+              <a:schemeClr val="lt1"/>
+            </a:fontRef>
+          </p:style>
+          <p:txBody>
+            <a:bodyPr rtlCol="0" anchor="ctr"/>
+            <a:lstStyle/>
+            <a:p>
+              <a:pPr algn="ctr"/>
+              <a:endParaRPr lang="en-US" sz="900"/>
+            </a:p>
+          </p:txBody>
+        </p:sp>
+      </p:grpSp>
+      <p:sp>
+        <p:nvSpPr>
+          <p:cNvPr id="138" name="Up-Down Arrow 137"/>
+          <p:cNvSpPr/>
+          <p:nvPr/>
+        </p:nvSpPr>
+        <p:spPr>
+          <a:xfrm>
+            <a:off x="4041508" y="2583993"/>
+            <a:ext cx="235445" cy="1356026"/>
+          </a:xfrm>
+          <a:prstGeom prst="upDownArrow">
+            <a:avLst/>
+          </a:prstGeom>
+        </p:spPr>
+        <p:style>
+          <a:lnRef idx="2">
+            <a:schemeClr val="accent5">
+              <a:shade val="50000"/>
+            </a:schemeClr>
+          </a:lnRef>
+          <a:fillRef idx="1">
+            <a:schemeClr val="accent5"/>
+          </a:fillRef>
+          <a:effectRef idx="0">
+            <a:schemeClr val="accent5"/>
+          </a:effectRef>
+          <a:fontRef idx="minor">
+            <a:schemeClr val="lt1"/>
+          </a:fontRef>
+        </p:style>
+        <p:txBody>
+          <a:bodyPr rtlCol="0" anchor="ctr"/>
+          <a:lstStyle/>
+          <a:p>
+            <a:pPr algn="ctr"/>
+            <a:endParaRPr lang="en-US"/>
+          </a:p>
+        </p:txBody>
+      </p:sp>
+    </p:spTree>
+    <p:extLst>
+      <p:ext uri="{BB962C8B-B14F-4D97-AF65-F5344CB8AC3E}">
+        <p14:creationId xmlns:p14="http://schemas.microsoft.com/office/powerpoint/2010/main" val="71868008"/>
+      </p:ext>
+    </p:extLst>
+  </p:cSld>
+  <p:clrMapOvr>
+    <a:masterClrMapping/>
+  </p:clrMapOvr>
+</p:sld>
+</file>
+
+<file path=ppt/slides/slide3.xml><?xml version="1.0" encoding="utf-8"?>
+<p:sld xmlns:a="http://schemas.openxmlformats.org/drawingml/2006/main" xmlns:r="http://schemas.openxmlformats.org/officeDocument/2006/relationships" xmlns:p="http://schemas.openxmlformats.org/presentationml/2006/main">
+  <p:cSld>
+    <p:spTree>
+      <p:nvGrpSpPr>
+        <p:cNvPr id="1" name=""/>
+        <p:cNvGrpSpPr/>
+        <p:nvPr/>
+      </p:nvGrpSpPr>
+      <p:grpSpPr>
+        <a:xfrm>
+          <a:off x="0" y="0"/>
+          <a:ext cx="0" cy="0"/>
+          <a:chOff x="0" y="0"/>
+          <a:chExt cx="0" cy="0"/>
+        </a:xfrm>
+      </p:grpSpPr>
+      <p:sp>
+        <p:nvSpPr>
           <p:cNvPr id="2" name="Title 1"/>
           <p:cNvSpPr>
             <a:spLocks noGrp="1"/>

</xml_diff>